<commit_message>
Correcting brewery count for CO
Fixed the brewery count by state slide to show CO having 47 breweries total.
</commit_message>
<xml_diff>
--- a/Case Study – Budweiser Brewery Insights.pptx
+++ b/Case Study – Budweiser Brewery Insights.pptx
@@ -8914,10 +8914,10 @@
       </p:grpSpPr>
       <p:pic>
         <p:nvPicPr>
-          <p:cNvPr id="4" name="Picture 3">
+          <p:cNvPr id="3" name="Picture 2">
             <a:extLst>
               <a:ext uri="{FF2B5EF4-FFF2-40B4-BE49-F238E27FC236}">
-                <a16:creationId xmlns:a16="http://schemas.microsoft.com/office/drawing/2014/main" id="{8351C8F7-ED8C-4390-BCB3-CB3C39702269}"/>
+                <a16:creationId xmlns:a16="http://schemas.microsoft.com/office/drawing/2014/main" id="{04BC66D1-B03C-4A27-9F6E-379A2AFB5B6A}"/>
               </a:ext>
             </a:extLst>
           </p:cNvPr>
@@ -8934,8 +8934,8 @@
         </p:blipFill>
         <p:spPr>
           <a:xfrm>
-            <a:off x="0" y="-382"/>
-            <a:ext cx="12186432" cy="6855631"/>
+            <a:off x="0" y="74919"/>
+            <a:ext cx="12192000" cy="6708162"/>
           </a:xfrm>
           <a:prstGeom prst="rect">
             <a:avLst/>

</xml_diff>